<commit_message>
Minor changes to Surv_Plots()
</commit_message>
<xml_diff>
--- a/QCATC777-Survival Curve.pptx
+++ b/QCATC777-Survival Curve.pptx
@@ -2325,7 +2325,7 @@
           <p:spPr>
             <a:xfrm>
               <a:off x="1693406" y="1040925"/>
-              <a:ext cx="4022806" cy="2984110"/>
+              <a:ext cx="3616434" cy="2984110"/>
             </a:xfrm>
             <a:prstGeom prst="rect">
               <a:avLst/>
@@ -2351,164 +2351,164 @@
           <p:spPr>
             <a:xfrm>
               <a:off x="1693406" y="1127841"/>
-              <a:ext cx="3949664" cy="1033332"/>
+              <a:ext cx="3550680" cy="1033332"/>
             </a:xfrm>
             <a:custGeom>
               <a:avLst/>
               <a:pathLst>
-                <a:path w="3949664" h="1033332">
+                <a:path w="3550680" h="1033332">
                   <a:moveTo>
                     <a:pt x="0" y="0"/>
                   </a:moveTo>
                   <a:lnTo>
-                    <a:pt x="1682264" y="0"/>
-                  </a:lnTo>
-                  <a:lnTo>
-                    <a:pt x="1682264" y="9657"/>
-                  </a:lnTo>
-                  <a:lnTo>
-                    <a:pt x="1901690" y="9657"/>
-                  </a:lnTo>
-                  <a:lnTo>
-                    <a:pt x="1901690" y="57943"/>
-                  </a:lnTo>
-                  <a:lnTo>
-                    <a:pt x="1974832" y="57943"/>
-                  </a:lnTo>
-                  <a:lnTo>
-                    <a:pt x="1974832" y="96573"/>
-                  </a:lnTo>
-                  <a:lnTo>
-                    <a:pt x="2121116" y="96573"/>
-                  </a:lnTo>
-                  <a:lnTo>
-                    <a:pt x="2121116" y="106230"/>
-                  </a:lnTo>
-                  <a:lnTo>
-                    <a:pt x="2194258" y="106230"/>
-                  </a:lnTo>
-                  <a:lnTo>
-                    <a:pt x="2194258" y="135202"/>
-                  </a:lnTo>
-                  <a:lnTo>
-                    <a:pt x="2267399" y="135202"/>
-                  </a:lnTo>
-                  <a:lnTo>
-                    <a:pt x="2267399" y="173831"/>
-                  </a:lnTo>
-                  <a:lnTo>
-                    <a:pt x="2340541" y="173831"/>
-                  </a:lnTo>
-                  <a:lnTo>
-                    <a:pt x="2340541" y="251090"/>
-                  </a:lnTo>
-                  <a:lnTo>
-                    <a:pt x="2413683" y="251090"/>
-                  </a:lnTo>
-                  <a:lnTo>
-                    <a:pt x="2413683" y="309034"/>
-                  </a:lnTo>
-                  <a:lnTo>
-                    <a:pt x="2486825" y="309034"/>
-                  </a:lnTo>
-                  <a:lnTo>
-                    <a:pt x="2486825" y="366978"/>
-                  </a:lnTo>
-                  <a:lnTo>
-                    <a:pt x="2559967" y="366978"/>
-                  </a:lnTo>
-                  <a:lnTo>
-                    <a:pt x="2559967" y="444236"/>
-                  </a:lnTo>
-                  <a:lnTo>
-                    <a:pt x="2633109" y="444236"/>
-                  </a:lnTo>
-                  <a:lnTo>
-                    <a:pt x="2633109" y="550467"/>
-                  </a:lnTo>
-                  <a:lnTo>
-                    <a:pt x="2706251" y="550467"/>
-                  </a:lnTo>
-                  <a:lnTo>
-                    <a:pt x="2706251" y="627725"/>
-                  </a:lnTo>
-                  <a:lnTo>
-                    <a:pt x="2779393" y="627725"/>
-                  </a:lnTo>
-                  <a:lnTo>
-                    <a:pt x="2779393" y="656697"/>
-                  </a:lnTo>
-                  <a:lnTo>
-                    <a:pt x="2852535" y="656697"/>
-                  </a:lnTo>
-                  <a:lnTo>
-                    <a:pt x="2852535" y="695326"/>
-                  </a:lnTo>
-                  <a:lnTo>
-                    <a:pt x="2925677" y="695326"/>
-                  </a:lnTo>
-                  <a:lnTo>
-                    <a:pt x="2925677" y="753270"/>
-                  </a:lnTo>
-                  <a:lnTo>
-                    <a:pt x="2998819" y="753270"/>
-                  </a:lnTo>
-                  <a:lnTo>
-                    <a:pt x="2998819" y="772585"/>
-                  </a:lnTo>
-                  <a:lnTo>
-                    <a:pt x="3145103" y="772585"/>
-                  </a:lnTo>
-                  <a:lnTo>
-                    <a:pt x="3145103" y="791899"/>
-                  </a:lnTo>
-                  <a:lnTo>
-                    <a:pt x="3218245" y="791899"/>
-                  </a:lnTo>
-                  <a:lnTo>
-                    <a:pt x="3218245" y="811214"/>
-                  </a:lnTo>
-                  <a:lnTo>
-                    <a:pt x="3291387" y="811214"/>
-                  </a:lnTo>
-                  <a:lnTo>
-                    <a:pt x="3291387" y="869158"/>
-                  </a:lnTo>
-                  <a:lnTo>
-                    <a:pt x="3364528" y="869158"/>
-                  </a:lnTo>
-                  <a:lnTo>
-                    <a:pt x="3364528" y="878815"/>
-                  </a:lnTo>
-                  <a:lnTo>
-                    <a:pt x="3437670" y="878815"/>
-                  </a:lnTo>
-                  <a:lnTo>
-                    <a:pt x="3437670" y="917445"/>
-                  </a:lnTo>
-                  <a:lnTo>
-                    <a:pt x="3510812" y="917445"/>
-                  </a:lnTo>
-                  <a:lnTo>
-                    <a:pt x="3510812" y="975388"/>
-                  </a:lnTo>
-                  <a:lnTo>
-                    <a:pt x="3583954" y="975388"/>
-                  </a:lnTo>
-                  <a:lnTo>
-                    <a:pt x="3583954" y="1004360"/>
-                  </a:lnTo>
-                  <a:lnTo>
-                    <a:pt x="3657096" y="1004360"/>
-                  </a:lnTo>
-                  <a:lnTo>
-                    <a:pt x="3657096" y="1023675"/>
-                  </a:lnTo>
-                  <a:lnTo>
-                    <a:pt x="3949664" y="1023675"/>
-                  </a:lnTo>
-                  <a:lnTo>
-                    <a:pt x="3949664" y="1033332"/>
+                    <a:pt x="1512327" y="0"/>
+                  </a:lnTo>
+                  <a:lnTo>
+                    <a:pt x="1512327" y="9657"/>
+                  </a:lnTo>
+                  <a:lnTo>
+                    <a:pt x="1709587" y="9657"/>
+                  </a:lnTo>
+                  <a:lnTo>
+                    <a:pt x="1709587" y="57943"/>
+                  </a:lnTo>
+                  <a:lnTo>
+                    <a:pt x="1775340" y="57943"/>
+                  </a:lnTo>
+                  <a:lnTo>
+                    <a:pt x="1775340" y="96573"/>
+                  </a:lnTo>
+                  <a:lnTo>
+                    <a:pt x="1906847" y="96573"/>
+                  </a:lnTo>
+                  <a:lnTo>
+                    <a:pt x="1906847" y="106230"/>
+                  </a:lnTo>
+                  <a:lnTo>
+                    <a:pt x="1972600" y="106230"/>
+                  </a:lnTo>
+                  <a:lnTo>
+                    <a:pt x="1972600" y="135202"/>
+                  </a:lnTo>
+                  <a:lnTo>
+                    <a:pt x="2038353" y="135202"/>
+                  </a:lnTo>
+                  <a:lnTo>
+                    <a:pt x="2038353" y="173831"/>
+                  </a:lnTo>
+                  <a:lnTo>
+                    <a:pt x="2104107" y="173831"/>
+                  </a:lnTo>
+                  <a:lnTo>
+                    <a:pt x="2104107" y="251090"/>
+                  </a:lnTo>
+                  <a:lnTo>
+                    <a:pt x="2169860" y="251090"/>
+                  </a:lnTo>
+                  <a:lnTo>
+                    <a:pt x="2169860" y="309034"/>
+                  </a:lnTo>
+                  <a:lnTo>
+                    <a:pt x="2235613" y="309034"/>
+                  </a:lnTo>
+                  <a:lnTo>
+                    <a:pt x="2235613" y="366978"/>
+                  </a:lnTo>
+                  <a:lnTo>
+                    <a:pt x="2301367" y="366978"/>
+                  </a:lnTo>
+                  <a:lnTo>
+                    <a:pt x="2301367" y="444236"/>
+                  </a:lnTo>
+                  <a:lnTo>
+                    <a:pt x="2367120" y="444236"/>
+                  </a:lnTo>
+                  <a:lnTo>
+                    <a:pt x="2367120" y="550467"/>
+                  </a:lnTo>
+                  <a:lnTo>
+                    <a:pt x="2432873" y="550467"/>
+                  </a:lnTo>
+                  <a:lnTo>
+                    <a:pt x="2432873" y="627725"/>
+                  </a:lnTo>
+                  <a:lnTo>
+                    <a:pt x="2498627" y="627725"/>
+                  </a:lnTo>
+                  <a:lnTo>
+                    <a:pt x="2498627" y="656697"/>
+                  </a:lnTo>
+                  <a:lnTo>
+                    <a:pt x="2564380" y="656697"/>
+                  </a:lnTo>
+                  <a:lnTo>
+                    <a:pt x="2564380" y="695326"/>
+                  </a:lnTo>
+                  <a:lnTo>
+                    <a:pt x="2630133" y="695326"/>
+                  </a:lnTo>
+                  <a:lnTo>
+                    <a:pt x="2630133" y="753270"/>
+                  </a:lnTo>
+                  <a:lnTo>
+                    <a:pt x="2695887" y="753270"/>
+                  </a:lnTo>
+                  <a:lnTo>
+                    <a:pt x="2695887" y="772585"/>
+                  </a:lnTo>
+                  <a:lnTo>
+                    <a:pt x="2827394" y="772585"/>
+                  </a:lnTo>
+                  <a:lnTo>
+                    <a:pt x="2827394" y="791899"/>
+                  </a:lnTo>
+                  <a:lnTo>
+                    <a:pt x="2893147" y="791899"/>
+                  </a:lnTo>
+                  <a:lnTo>
+                    <a:pt x="2893147" y="811214"/>
+                  </a:lnTo>
+                  <a:lnTo>
+                    <a:pt x="2958900" y="811214"/>
+                  </a:lnTo>
+                  <a:lnTo>
+                    <a:pt x="2958900" y="869158"/>
+                  </a:lnTo>
+                  <a:lnTo>
+                    <a:pt x="3024654" y="869158"/>
+                  </a:lnTo>
+                  <a:lnTo>
+                    <a:pt x="3024654" y="878815"/>
+                  </a:lnTo>
+                  <a:lnTo>
+                    <a:pt x="3090407" y="878815"/>
+                  </a:lnTo>
+                  <a:lnTo>
+                    <a:pt x="3090407" y="917445"/>
+                  </a:lnTo>
+                  <a:lnTo>
+                    <a:pt x="3156160" y="917445"/>
+                  </a:lnTo>
+                  <a:lnTo>
+                    <a:pt x="3156160" y="975388"/>
+                  </a:lnTo>
+                  <a:lnTo>
+                    <a:pt x="3221914" y="975388"/>
+                  </a:lnTo>
+                  <a:lnTo>
+                    <a:pt x="3221914" y="1004360"/>
+                  </a:lnTo>
+                  <a:lnTo>
+                    <a:pt x="3287667" y="1004360"/>
+                  </a:lnTo>
+                  <a:lnTo>
+                    <a:pt x="3287667" y="1023675"/>
+                  </a:lnTo>
+                  <a:lnTo>
+                    <a:pt x="3550680" y="1023675"/>
+                  </a:lnTo>
+                  <a:lnTo>
+                    <a:pt x="3550680" y="1033332"/>
                   </a:lnTo>
                 </a:path>
               </a:pathLst>
@@ -2538,12 +2538,12 @@
           <p:spPr>
             <a:xfrm>
               <a:off x="1693406" y="1127841"/>
-              <a:ext cx="3949664" cy="1042990"/>
+              <a:ext cx="3550680" cy="1042990"/>
             </a:xfrm>
             <a:custGeom>
               <a:avLst/>
               <a:pathLst>
-                <a:path w="3949664" h="1042990">
+                <a:path w="3550680" h="1042990">
                   <a:moveTo>
                     <a:pt x="0" y="0"/>
                   </a:moveTo>
@@ -2554,172 +2554,172 @@
                     <a:pt x="0" y="9657"/>
                   </a:lnTo>
                   <a:lnTo>
-                    <a:pt x="292567" y="9657"/>
-                  </a:lnTo>
-                  <a:lnTo>
-                    <a:pt x="292567" y="19314"/>
-                  </a:lnTo>
-                  <a:lnTo>
-                    <a:pt x="511993" y="19314"/>
-                  </a:lnTo>
-                  <a:lnTo>
-                    <a:pt x="511993" y="28971"/>
-                  </a:lnTo>
-                  <a:lnTo>
-                    <a:pt x="1389696" y="28971"/>
-                  </a:lnTo>
-                  <a:lnTo>
-                    <a:pt x="1389696" y="38629"/>
-                  </a:lnTo>
-                  <a:lnTo>
-                    <a:pt x="1462838" y="38629"/>
-                  </a:lnTo>
-                  <a:lnTo>
-                    <a:pt x="1462838" y="57943"/>
-                  </a:lnTo>
-                  <a:lnTo>
-                    <a:pt x="1535980" y="57943"/>
-                  </a:lnTo>
-                  <a:lnTo>
-                    <a:pt x="1535980" y="67601"/>
-                  </a:lnTo>
-                  <a:lnTo>
-                    <a:pt x="1609122" y="67601"/>
-                  </a:lnTo>
-                  <a:lnTo>
-                    <a:pt x="1609122" y="86915"/>
-                  </a:lnTo>
-                  <a:lnTo>
-                    <a:pt x="1755406" y="86915"/>
-                  </a:lnTo>
-                  <a:lnTo>
-                    <a:pt x="1755406" y="106230"/>
-                  </a:lnTo>
-                  <a:lnTo>
-                    <a:pt x="1828548" y="106230"/>
-                  </a:lnTo>
-                  <a:lnTo>
-                    <a:pt x="1828548" y="125545"/>
-                  </a:lnTo>
-                  <a:lnTo>
-                    <a:pt x="1901690" y="125545"/>
-                  </a:lnTo>
-                  <a:lnTo>
-                    <a:pt x="1901690" y="164174"/>
-                  </a:lnTo>
-                  <a:lnTo>
-                    <a:pt x="1974832" y="164174"/>
-                  </a:lnTo>
-                  <a:lnTo>
-                    <a:pt x="1974832" y="241432"/>
-                  </a:lnTo>
-                  <a:lnTo>
-                    <a:pt x="2047974" y="241432"/>
-                  </a:lnTo>
-                  <a:lnTo>
-                    <a:pt x="2047974" y="280062"/>
-                  </a:lnTo>
-                  <a:lnTo>
-                    <a:pt x="2121116" y="280062"/>
-                  </a:lnTo>
-                  <a:lnTo>
-                    <a:pt x="2121116" y="357320"/>
-                  </a:lnTo>
-                  <a:lnTo>
-                    <a:pt x="2194258" y="357320"/>
-                  </a:lnTo>
-                  <a:lnTo>
-                    <a:pt x="2194258" y="502180"/>
-                  </a:lnTo>
-                  <a:lnTo>
-                    <a:pt x="2267399" y="502180"/>
-                  </a:lnTo>
-                  <a:lnTo>
-                    <a:pt x="2267399" y="560124"/>
-                  </a:lnTo>
-                  <a:lnTo>
-                    <a:pt x="2340541" y="560124"/>
-                  </a:lnTo>
-                  <a:lnTo>
-                    <a:pt x="2340541" y="589096"/>
-                  </a:lnTo>
-                  <a:lnTo>
-                    <a:pt x="2413683" y="589096"/>
-                  </a:lnTo>
-                  <a:lnTo>
-                    <a:pt x="2413683" y="676012"/>
-                  </a:lnTo>
-                  <a:lnTo>
-                    <a:pt x="2486825" y="676012"/>
-                  </a:lnTo>
-                  <a:lnTo>
-                    <a:pt x="2486825" y="733956"/>
-                  </a:lnTo>
-                  <a:lnTo>
-                    <a:pt x="2559967" y="733956"/>
-                  </a:lnTo>
-                  <a:lnTo>
-                    <a:pt x="2559967" y="811214"/>
-                  </a:lnTo>
-                  <a:lnTo>
-                    <a:pt x="2633109" y="811214"/>
-                  </a:lnTo>
-                  <a:lnTo>
-                    <a:pt x="2633109" y="849843"/>
-                  </a:lnTo>
-                  <a:lnTo>
-                    <a:pt x="2706251" y="849843"/>
-                  </a:lnTo>
-                  <a:lnTo>
-                    <a:pt x="2706251" y="907787"/>
-                  </a:lnTo>
-                  <a:lnTo>
-                    <a:pt x="2779393" y="907787"/>
-                  </a:lnTo>
-                  <a:lnTo>
-                    <a:pt x="2779393" y="936759"/>
-                  </a:lnTo>
-                  <a:lnTo>
-                    <a:pt x="2925677" y="936759"/>
-                  </a:lnTo>
-                  <a:lnTo>
-                    <a:pt x="2925677" y="965731"/>
-                  </a:lnTo>
-                  <a:lnTo>
-                    <a:pt x="2998819" y="965731"/>
-                  </a:lnTo>
-                  <a:lnTo>
-                    <a:pt x="2998819" y="985046"/>
-                  </a:lnTo>
-                  <a:lnTo>
-                    <a:pt x="3071961" y="985046"/>
-                  </a:lnTo>
-                  <a:lnTo>
-                    <a:pt x="3071961" y="994703"/>
-                  </a:lnTo>
-                  <a:lnTo>
-                    <a:pt x="3145103" y="994703"/>
-                  </a:lnTo>
-                  <a:lnTo>
-                    <a:pt x="3145103" y="1023675"/>
-                  </a:lnTo>
-                  <a:lnTo>
-                    <a:pt x="3510812" y="1023675"/>
-                  </a:lnTo>
-                  <a:lnTo>
-                    <a:pt x="3510812" y="1033332"/>
-                  </a:lnTo>
-                  <a:lnTo>
-                    <a:pt x="3583954" y="1033332"/>
-                  </a:lnTo>
-                  <a:lnTo>
-                    <a:pt x="3583954" y="1042990"/>
-                  </a:lnTo>
-                  <a:lnTo>
-                    <a:pt x="3949664" y="1042990"/>
-                  </a:lnTo>
-                  <a:lnTo>
-                    <a:pt x="3949664" y="1042990"/>
+                    <a:pt x="263013" y="9657"/>
+                  </a:lnTo>
+                  <a:lnTo>
+                    <a:pt x="263013" y="19314"/>
+                  </a:lnTo>
+                  <a:lnTo>
+                    <a:pt x="460273" y="19314"/>
+                  </a:lnTo>
+                  <a:lnTo>
+                    <a:pt x="460273" y="28971"/>
+                  </a:lnTo>
+                  <a:lnTo>
+                    <a:pt x="1249313" y="28971"/>
+                  </a:lnTo>
+                  <a:lnTo>
+                    <a:pt x="1249313" y="38629"/>
+                  </a:lnTo>
+                  <a:lnTo>
+                    <a:pt x="1315066" y="38629"/>
+                  </a:lnTo>
+                  <a:lnTo>
+                    <a:pt x="1315066" y="57943"/>
+                  </a:lnTo>
+                  <a:lnTo>
+                    <a:pt x="1380820" y="57943"/>
+                  </a:lnTo>
+                  <a:lnTo>
+                    <a:pt x="1380820" y="67601"/>
+                  </a:lnTo>
+                  <a:lnTo>
+                    <a:pt x="1446573" y="67601"/>
+                  </a:lnTo>
+                  <a:lnTo>
+                    <a:pt x="1446573" y="86915"/>
+                  </a:lnTo>
+                  <a:lnTo>
+                    <a:pt x="1578080" y="86915"/>
+                  </a:lnTo>
+                  <a:lnTo>
+                    <a:pt x="1578080" y="106230"/>
+                  </a:lnTo>
+                  <a:lnTo>
+                    <a:pt x="1643833" y="106230"/>
+                  </a:lnTo>
+                  <a:lnTo>
+                    <a:pt x="1643833" y="125545"/>
+                  </a:lnTo>
+                  <a:lnTo>
+                    <a:pt x="1709587" y="125545"/>
+                  </a:lnTo>
+                  <a:lnTo>
+                    <a:pt x="1709587" y="164174"/>
+                  </a:lnTo>
+                  <a:lnTo>
+                    <a:pt x="1775340" y="164174"/>
+                  </a:lnTo>
+                  <a:lnTo>
+                    <a:pt x="1775340" y="241432"/>
+                  </a:lnTo>
+                  <a:lnTo>
+                    <a:pt x="1841093" y="241432"/>
+                  </a:lnTo>
+                  <a:lnTo>
+                    <a:pt x="1841093" y="280062"/>
+                  </a:lnTo>
+                  <a:lnTo>
+                    <a:pt x="1906847" y="280062"/>
+                  </a:lnTo>
+                  <a:lnTo>
+                    <a:pt x="1906847" y="357320"/>
+                  </a:lnTo>
+                  <a:lnTo>
+                    <a:pt x="1972600" y="357320"/>
+                  </a:lnTo>
+                  <a:lnTo>
+                    <a:pt x="1972600" y="502180"/>
+                  </a:lnTo>
+                  <a:lnTo>
+                    <a:pt x="2038353" y="502180"/>
+                  </a:lnTo>
+                  <a:lnTo>
+                    <a:pt x="2038353" y="560124"/>
+                  </a:lnTo>
+                  <a:lnTo>
+                    <a:pt x="2104107" y="560124"/>
+                  </a:lnTo>
+                  <a:lnTo>
+                    <a:pt x="2104107" y="589096"/>
+                  </a:lnTo>
+                  <a:lnTo>
+                    <a:pt x="2169860" y="589096"/>
+                  </a:lnTo>
+                  <a:lnTo>
+                    <a:pt x="2169860" y="676012"/>
+                  </a:lnTo>
+                  <a:lnTo>
+                    <a:pt x="2235613" y="676012"/>
+                  </a:lnTo>
+                  <a:lnTo>
+                    <a:pt x="2235613" y="733956"/>
+                  </a:lnTo>
+                  <a:lnTo>
+                    <a:pt x="2301367" y="733956"/>
+                  </a:lnTo>
+                  <a:lnTo>
+                    <a:pt x="2301367" y="811214"/>
+                  </a:lnTo>
+                  <a:lnTo>
+                    <a:pt x="2367120" y="811214"/>
+                  </a:lnTo>
+                  <a:lnTo>
+                    <a:pt x="2367120" y="849843"/>
+                  </a:lnTo>
+                  <a:lnTo>
+                    <a:pt x="2432873" y="849843"/>
+                  </a:lnTo>
+                  <a:lnTo>
+                    <a:pt x="2432873" y="907787"/>
+                  </a:lnTo>
+                  <a:lnTo>
+                    <a:pt x="2498627" y="907787"/>
+                  </a:lnTo>
+                  <a:lnTo>
+                    <a:pt x="2498627" y="936759"/>
+                  </a:lnTo>
+                  <a:lnTo>
+                    <a:pt x="2630133" y="936759"/>
+                  </a:lnTo>
+                  <a:lnTo>
+                    <a:pt x="2630133" y="965731"/>
+                  </a:lnTo>
+                  <a:lnTo>
+                    <a:pt x="2695887" y="965731"/>
+                  </a:lnTo>
+                  <a:lnTo>
+                    <a:pt x="2695887" y="985046"/>
+                  </a:lnTo>
+                  <a:lnTo>
+                    <a:pt x="2761640" y="985046"/>
+                  </a:lnTo>
+                  <a:lnTo>
+                    <a:pt x="2761640" y="994703"/>
+                  </a:lnTo>
+                  <a:lnTo>
+                    <a:pt x="2827394" y="994703"/>
+                  </a:lnTo>
+                  <a:lnTo>
+                    <a:pt x="2827394" y="1023675"/>
+                  </a:lnTo>
+                  <a:lnTo>
+                    <a:pt x="3156160" y="1023675"/>
+                  </a:lnTo>
+                  <a:lnTo>
+                    <a:pt x="3156160" y="1033332"/>
+                  </a:lnTo>
+                  <a:lnTo>
+                    <a:pt x="3221914" y="1033332"/>
+                  </a:lnTo>
+                  <a:lnTo>
+                    <a:pt x="3221914" y="1042990"/>
+                  </a:lnTo>
+                  <a:lnTo>
+                    <a:pt x="3550680" y="1042990"/>
+                  </a:lnTo>
+                  <a:lnTo>
+                    <a:pt x="3550680" y="1042990"/>
                   </a:lnTo>
                 </a:path>
               </a:pathLst>
@@ -2749,170 +2749,170 @@
           <p:spPr>
             <a:xfrm>
               <a:off x="1693406" y="1127841"/>
-              <a:ext cx="3949664" cy="849843"/>
+              <a:ext cx="3550680" cy="849843"/>
             </a:xfrm>
             <a:custGeom>
               <a:avLst/>
               <a:pathLst>
-                <a:path w="3949664" h="849843">
+                <a:path w="3550680" h="849843">
                   <a:moveTo>
                     <a:pt x="0" y="0"/>
                   </a:moveTo>
                   <a:lnTo>
-                    <a:pt x="1462838" y="0"/>
-                  </a:lnTo>
-                  <a:lnTo>
-                    <a:pt x="1462838" y="9657"/>
-                  </a:lnTo>
-                  <a:lnTo>
-                    <a:pt x="1609122" y="9657"/>
-                  </a:lnTo>
-                  <a:lnTo>
-                    <a:pt x="1609122" y="19314"/>
-                  </a:lnTo>
-                  <a:lnTo>
-                    <a:pt x="1755406" y="19314"/>
-                  </a:lnTo>
-                  <a:lnTo>
-                    <a:pt x="1755406" y="28971"/>
-                  </a:lnTo>
-                  <a:lnTo>
-                    <a:pt x="1901690" y="28971"/>
-                  </a:lnTo>
-                  <a:lnTo>
-                    <a:pt x="1901690" y="48286"/>
-                  </a:lnTo>
-                  <a:lnTo>
-                    <a:pt x="1974832" y="48286"/>
-                  </a:lnTo>
-                  <a:lnTo>
-                    <a:pt x="1974832" y="77258"/>
-                  </a:lnTo>
-                  <a:lnTo>
-                    <a:pt x="2047974" y="77258"/>
-                  </a:lnTo>
-                  <a:lnTo>
-                    <a:pt x="2047974" y="106230"/>
-                  </a:lnTo>
-                  <a:lnTo>
-                    <a:pt x="2121116" y="106230"/>
-                  </a:lnTo>
-                  <a:lnTo>
-                    <a:pt x="2121116" y="125545"/>
-                  </a:lnTo>
-                  <a:lnTo>
-                    <a:pt x="2194258" y="125545"/>
-                  </a:lnTo>
-                  <a:lnTo>
-                    <a:pt x="2194258" y="173831"/>
-                  </a:lnTo>
-                  <a:lnTo>
-                    <a:pt x="2267399" y="173831"/>
-                  </a:lnTo>
-                  <a:lnTo>
-                    <a:pt x="2267399" y="241432"/>
-                  </a:lnTo>
-                  <a:lnTo>
-                    <a:pt x="2340541" y="241432"/>
-                  </a:lnTo>
-                  <a:lnTo>
-                    <a:pt x="2340541" y="260747"/>
-                  </a:lnTo>
-                  <a:lnTo>
-                    <a:pt x="2413683" y="260747"/>
-                  </a:lnTo>
-                  <a:lnTo>
-                    <a:pt x="2413683" y="366978"/>
-                  </a:lnTo>
-                  <a:lnTo>
-                    <a:pt x="2486825" y="366978"/>
-                  </a:lnTo>
-                  <a:lnTo>
-                    <a:pt x="2486825" y="444236"/>
-                  </a:lnTo>
-                  <a:lnTo>
-                    <a:pt x="2559967" y="444236"/>
-                  </a:lnTo>
-                  <a:lnTo>
-                    <a:pt x="2559967" y="540809"/>
-                  </a:lnTo>
-                  <a:lnTo>
-                    <a:pt x="2633109" y="540809"/>
-                  </a:lnTo>
-                  <a:lnTo>
-                    <a:pt x="2633109" y="598753"/>
-                  </a:lnTo>
-                  <a:lnTo>
-                    <a:pt x="2706251" y="598753"/>
-                  </a:lnTo>
-                  <a:lnTo>
-                    <a:pt x="2706251" y="656697"/>
-                  </a:lnTo>
-                  <a:lnTo>
-                    <a:pt x="2779393" y="656697"/>
-                  </a:lnTo>
-                  <a:lnTo>
-                    <a:pt x="2779393" y="695326"/>
-                  </a:lnTo>
-                  <a:lnTo>
-                    <a:pt x="2852535" y="695326"/>
-                  </a:lnTo>
-                  <a:lnTo>
-                    <a:pt x="2852535" y="724298"/>
-                  </a:lnTo>
-                  <a:lnTo>
-                    <a:pt x="2925677" y="724298"/>
-                  </a:lnTo>
-                  <a:lnTo>
-                    <a:pt x="2925677" y="733956"/>
-                  </a:lnTo>
-                  <a:lnTo>
-                    <a:pt x="2998819" y="733956"/>
-                  </a:lnTo>
-                  <a:lnTo>
-                    <a:pt x="2998819" y="762927"/>
-                  </a:lnTo>
-                  <a:lnTo>
-                    <a:pt x="3145103" y="762927"/>
-                  </a:lnTo>
-                  <a:lnTo>
-                    <a:pt x="3145103" y="772585"/>
-                  </a:lnTo>
-                  <a:lnTo>
-                    <a:pt x="3218245" y="772585"/>
-                  </a:lnTo>
-                  <a:lnTo>
-                    <a:pt x="3218245" y="782242"/>
-                  </a:lnTo>
-                  <a:lnTo>
-                    <a:pt x="3291387" y="782242"/>
-                  </a:lnTo>
-                  <a:lnTo>
-                    <a:pt x="3291387" y="811214"/>
-                  </a:lnTo>
-                  <a:lnTo>
-                    <a:pt x="3510812" y="811214"/>
-                  </a:lnTo>
-                  <a:lnTo>
-                    <a:pt x="3510812" y="820871"/>
-                  </a:lnTo>
-                  <a:lnTo>
-                    <a:pt x="3583954" y="820871"/>
-                  </a:lnTo>
-                  <a:lnTo>
-                    <a:pt x="3583954" y="840186"/>
-                  </a:lnTo>
-                  <a:lnTo>
-                    <a:pt x="3730238" y="840186"/>
-                  </a:lnTo>
-                  <a:lnTo>
-                    <a:pt x="3730238" y="849843"/>
-                  </a:lnTo>
-                  <a:lnTo>
-                    <a:pt x="3949664" y="849843"/>
-                  </a:lnTo>
-                  <a:lnTo>
-                    <a:pt x="3949664" y="849843"/>
+                    <a:pt x="1315066" y="0"/>
+                  </a:lnTo>
+                  <a:lnTo>
+                    <a:pt x="1315066" y="9657"/>
+                  </a:lnTo>
+                  <a:lnTo>
+                    <a:pt x="1446573" y="9657"/>
+                  </a:lnTo>
+                  <a:lnTo>
+                    <a:pt x="1446573" y="19314"/>
+                  </a:lnTo>
+                  <a:lnTo>
+                    <a:pt x="1578080" y="19314"/>
+                  </a:lnTo>
+                  <a:lnTo>
+                    <a:pt x="1578080" y="28971"/>
+                  </a:lnTo>
+                  <a:lnTo>
+                    <a:pt x="1709587" y="28971"/>
+                  </a:lnTo>
+                  <a:lnTo>
+                    <a:pt x="1709587" y="48286"/>
+                  </a:lnTo>
+                  <a:lnTo>
+                    <a:pt x="1775340" y="48286"/>
+                  </a:lnTo>
+                  <a:lnTo>
+                    <a:pt x="1775340" y="77258"/>
+                  </a:lnTo>
+                  <a:lnTo>
+                    <a:pt x="1841093" y="77258"/>
+                  </a:lnTo>
+                  <a:lnTo>
+                    <a:pt x="1841093" y="106230"/>
+                  </a:lnTo>
+                  <a:lnTo>
+                    <a:pt x="1906847" y="106230"/>
+                  </a:lnTo>
+                  <a:lnTo>
+                    <a:pt x="1906847" y="125545"/>
+                  </a:lnTo>
+                  <a:lnTo>
+                    <a:pt x="1972600" y="125545"/>
+                  </a:lnTo>
+                  <a:lnTo>
+                    <a:pt x="1972600" y="173831"/>
+                  </a:lnTo>
+                  <a:lnTo>
+                    <a:pt x="2038353" y="173831"/>
+                  </a:lnTo>
+                  <a:lnTo>
+                    <a:pt x="2038353" y="241432"/>
+                  </a:lnTo>
+                  <a:lnTo>
+                    <a:pt x="2104107" y="241432"/>
+                  </a:lnTo>
+                  <a:lnTo>
+                    <a:pt x="2104107" y="260747"/>
+                  </a:lnTo>
+                  <a:lnTo>
+                    <a:pt x="2169860" y="260747"/>
+                  </a:lnTo>
+                  <a:lnTo>
+                    <a:pt x="2169860" y="366978"/>
+                  </a:lnTo>
+                  <a:lnTo>
+                    <a:pt x="2235613" y="366978"/>
+                  </a:lnTo>
+                  <a:lnTo>
+                    <a:pt x="2235613" y="444236"/>
+                  </a:lnTo>
+                  <a:lnTo>
+                    <a:pt x="2301367" y="444236"/>
+                  </a:lnTo>
+                  <a:lnTo>
+                    <a:pt x="2301367" y="540809"/>
+                  </a:lnTo>
+                  <a:lnTo>
+                    <a:pt x="2367120" y="540809"/>
+                  </a:lnTo>
+                  <a:lnTo>
+                    <a:pt x="2367120" y="598753"/>
+                  </a:lnTo>
+                  <a:lnTo>
+                    <a:pt x="2432873" y="598753"/>
+                  </a:lnTo>
+                  <a:lnTo>
+                    <a:pt x="2432873" y="656697"/>
+                  </a:lnTo>
+                  <a:lnTo>
+                    <a:pt x="2498627" y="656697"/>
+                  </a:lnTo>
+                  <a:lnTo>
+                    <a:pt x="2498627" y="695326"/>
+                  </a:lnTo>
+                  <a:lnTo>
+                    <a:pt x="2564380" y="695326"/>
+                  </a:lnTo>
+                  <a:lnTo>
+                    <a:pt x="2564380" y="724298"/>
+                  </a:lnTo>
+                  <a:lnTo>
+                    <a:pt x="2630133" y="724298"/>
+                  </a:lnTo>
+                  <a:lnTo>
+                    <a:pt x="2630133" y="733956"/>
+                  </a:lnTo>
+                  <a:lnTo>
+                    <a:pt x="2695887" y="733956"/>
+                  </a:lnTo>
+                  <a:lnTo>
+                    <a:pt x="2695887" y="762927"/>
+                  </a:lnTo>
+                  <a:lnTo>
+                    <a:pt x="2827394" y="762927"/>
+                  </a:lnTo>
+                  <a:lnTo>
+                    <a:pt x="2827394" y="772585"/>
+                  </a:lnTo>
+                  <a:lnTo>
+                    <a:pt x="2893147" y="772585"/>
+                  </a:lnTo>
+                  <a:lnTo>
+                    <a:pt x="2893147" y="782242"/>
+                  </a:lnTo>
+                  <a:lnTo>
+                    <a:pt x="2958900" y="782242"/>
+                  </a:lnTo>
+                  <a:lnTo>
+                    <a:pt x="2958900" y="811214"/>
+                  </a:lnTo>
+                  <a:lnTo>
+                    <a:pt x="3156160" y="811214"/>
+                  </a:lnTo>
+                  <a:lnTo>
+                    <a:pt x="3156160" y="820871"/>
+                  </a:lnTo>
+                  <a:lnTo>
+                    <a:pt x="3221914" y="820871"/>
+                  </a:lnTo>
+                  <a:lnTo>
+                    <a:pt x="3221914" y="840186"/>
+                  </a:lnTo>
+                  <a:lnTo>
+                    <a:pt x="3353420" y="840186"/>
+                  </a:lnTo>
+                  <a:lnTo>
+                    <a:pt x="3353420" y="849843"/>
+                  </a:lnTo>
+                  <a:lnTo>
+                    <a:pt x="3550680" y="849843"/>
+                  </a:lnTo>
+                  <a:lnTo>
+                    <a:pt x="3550680" y="849843"/>
                   </a:lnTo>
                 </a:path>
               </a:pathLst>
@@ -2942,170 +2942,170 @@
           <p:spPr>
             <a:xfrm>
               <a:off x="1693406" y="1127841"/>
-              <a:ext cx="3949664" cy="927102"/>
+              <a:ext cx="3550680" cy="927102"/>
             </a:xfrm>
             <a:custGeom>
               <a:avLst/>
               <a:pathLst>
-                <a:path w="3949664" h="927102">
+                <a:path w="3550680" h="927102">
                   <a:moveTo>
                     <a:pt x="0" y="0"/>
                   </a:moveTo>
                   <a:lnTo>
-                    <a:pt x="1389696" y="0"/>
-                  </a:lnTo>
-                  <a:lnTo>
-                    <a:pt x="1389696" y="9657"/>
-                  </a:lnTo>
-                  <a:lnTo>
-                    <a:pt x="1535980" y="9657"/>
-                  </a:lnTo>
-                  <a:lnTo>
-                    <a:pt x="1535980" y="19314"/>
-                  </a:lnTo>
-                  <a:lnTo>
-                    <a:pt x="1609122" y="19314"/>
-                  </a:lnTo>
-                  <a:lnTo>
-                    <a:pt x="1609122" y="28971"/>
-                  </a:lnTo>
-                  <a:lnTo>
-                    <a:pt x="1828548" y="28971"/>
-                  </a:lnTo>
-                  <a:lnTo>
-                    <a:pt x="1828548" y="38629"/>
-                  </a:lnTo>
-                  <a:lnTo>
-                    <a:pt x="1901690" y="38629"/>
-                  </a:lnTo>
-                  <a:lnTo>
-                    <a:pt x="1901690" y="57943"/>
-                  </a:lnTo>
-                  <a:lnTo>
-                    <a:pt x="1974832" y="57943"/>
-                  </a:lnTo>
-                  <a:lnTo>
-                    <a:pt x="1974832" y="77258"/>
-                  </a:lnTo>
-                  <a:lnTo>
-                    <a:pt x="2047974" y="77258"/>
-                  </a:lnTo>
-                  <a:lnTo>
-                    <a:pt x="2047974" y="86915"/>
-                  </a:lnTo>
-                  <a:lnTo>
-                    <a:pt x="2121116" y="86915"/>
-                  </a:lnTo>
-                  <a:lnTo>
-                    <a:pt x="2121116" y="154517"/>
-                  </a:lnTo>
-                  <a:lnTo>
-                    <a:pt x="2194258" y="154517"/>
-                  </a:lnTo>
-                  <a:lnTo>
-                    <a:pt x="2194258" y="222118"/>
-                  </a:lnTo>
-                  <a:lnTo>
-                    <a:pt x="2267399" y="222118"/>
-                  </a:lnTo>
-                  <a:lnTo>
-                    <a:pt x="2267399" y="318691"/>
-                  </a:lnTo>
-                  <a:lnTo>
-                    <a:pt x="2340541" y="318691"/>
-                  </a:lnTo>
-                  <a:lnTo>
-                    <a:pt x="2340541" y="357320"/>
-                  </a:lnTo>
-                  <a:lnTo>
-                    <a:pt x="2413683" y="357320"/>
-                  </a:lnTo>
-                  <a:lnTo>
-                    <a:pt x="2413683" y="386292"/>
-                  </a:lnTo>
-                  <a:lnTo>
-                    <a:pt x="2486825" y="386292"/>
-                  </a:lnTo>
-                  <a:lnTo>
-                    <a:pt x="2486825" y="453893"/>
-                  </a:lnTo>
-                  <a:lnTo>
-                    <a:pt x="2559967" y="453893"/>
-                  </a:lnTo>
-                  <a:lnTo>
-                    <a:pt x="2559967" y="579438"/>
-                  </a:lnTo>
-                  <a:lnTo>
-                    <a:pt x="2633109" y="579438"/>
-                  </a:lnTo>
-                  <a:lnTo>
-                    <a:pt x="2633109" y="656697"/>
-                  </a:lnTo>
-                  <a:lnTo>
-                    <a:pt x="2706251" y="656697"/>
-                  </a:lnTo>
-                  <a:lnTo>
-                    <a:pt x="2706251" y="695326"/>
-                  </a:lnTo>
-                  <a:lnTo>
-                    <a:pt x="2779393" y="695326"/>
-                  </a:lnTo>
-                  <a:lnTo>
-                    <a:pt x="2779393" y="762927"/>
-                  </a:lnTo>
-                  <a:lnTo>
-                    <a:pt x="2852535" y="762927"/>
-                  </a:lnTo>
-                  <a:lnTo>
-                    <a:pt x="2852535" y="811214"/>
-                  </a:lnTo>
-                  <a:lnTo>
-                    <a:pt x="2925677" y="811214"/>
-                  </a:lnTo>
-                  <a:lnTo>
-                    <a:pt x="2925677" y="830529"/>
-                  </a:lnTo>
-                  <a:lnTo>
-                    <a:pt x="3071961" y="830529"/>
-                  </a:lnTo>
-                  <a:lnTo>
-                    <a:pt x="3071961" y="840186"/>
-                  </a:lnTo>
-                  <a:lnTo>
-                    <a:pt x="3291387" y="840186"/>
-                  </a:lnTo>
-                  <a:lnTo>
-                    <a:pt x="3291387" y="859501"/>
-                  </a:lnTo>
-                  <a:lnTo>
-                    <a:pt x="3364528" y="859501"/>
-                  </a:lnTo>
-                  <a:lnTo>
-                    <a:pt x="3364528" y="869158"/>
-                  </a:lnTo>
-                  <a:lnTo>
-                    <a:pt x="3437670" y="869158"/>
-                  </a:lnTo>
-                  <a:lnTo>
-                    <a:pt x="3437670" y="888473"/>
-                  </a:lnTo>
-                  <a:lnTo>
-                    <a:pt x="3510812" y="888473"/>
-                  </a:lnTo>
-                  <a:lnTo>
-                    <a:pt x="3510812" y="907787"/>
-                  </a:lnTo>
-                  <a:lnTo>
-                    <a:pt x="3730238" y="907787"/>
-                  </a:lnTo>
-                  <a:lnTo>
-                    <a:pt x="3730238" y="917445"/>
-                  </a:lnTo>
-                  <a:lnTo>
-                    <a:pt x="3949664" y="917445"/>
-                  </a:lnTo>
-                  <a:lnTo>
-                    <a:pt x="3949664" y="927102"/>
+                    <a:pt x="1249313" y="0"/>
+                  </a:lnTo>
+                  <a:lnTo>
+                    <a:pt x="1249313" y="9657"/>
+                  </a:lnTo>
+                  <a:lnTo>
+                    <a:pt x="1380820" y="9657"/>
+                  </a:lnTo>
+                  <a:lnTo>
+                    <a:pt x="1380820" y="19314"/>
+                  </a:lnTo>
+                  <a:lnTo>
+                    <a:pt x="1446573" y="19314"/>
+                  </a:lnTo>
+                  <a:lnTo>
+                    <a:pt x="1446573" y="28971"/>
+                  </a:lnTo>
+                  <a:lnTo>
+                    <a:pt x="1643833" y="28971"/>
+                  </a:lnTo>
+                  <a:lnTo>
+                    <a:pt x="1643833" y="38629"/>
+                  </a:lnTo>
+                  <a:lnTo>
+                    <a:pt x="1709587" y="38629"/>
+                  </a:lnTo>
+                  <a:lnTo>
+                    <a:pt x="1709587" y="57943"/>
+                  </a:lnTo>
+                  <a:lnTo>
+                    <a:pt x="1775340" y="57943"/>
+                  </a:lnTo>
+                  <a:lnTo>
+                    <a:pt x="1775340" y="77258"/>
+                  </a:lnTo>
+                  <a:lnTo>
+                    <a:pt x="1841093" y="77258"/>
+                  </a:lnTo>
+                  <a:lnTo>
+                    <a:pt x="1841093" y="86915"/>
+                  </a:lnTo>
+                  <a:lnTo>
+                    <a:pt x="1906847" y="86915"/>
+                  </a:lnTo>
+                  <a:lnTo>
+                    <a:pt x="1906847" y="154517"/>
+                  </a:lnTo>
+                  <a:lnTo>
+                    <a:pt x="1972600" y="154517"/>
+                  </a:lnTo>
+                  <a:lnTo>
+                    <a:pt x="1972600" y="222118"/>
+                  </a:lnTo>
+                  <a:lnTo>
+                    <a:pt x="2038353" y="222118"/>
+                  </a:lnTo>
+                  <a:lnTo>
+                    <a:pt x="2038353" y="318691"/>
+                  </a:lnTo>
+                  <a:lnTo>
+                    <a:pt x="2104107" y="318691"/>
+                  </a:lnTo>
+                  <a:lnTo>
+                    <a:pt x="2104107" y="357320"/>
+                  </a:lnTo>
+                  <a:lnTo>
+                    <a:pt x="2169860" y="357320"/>
+                  </a:lnTo>
+                  <a:lnTo>
+                    <a:pt x="2169860" y="386292"/>
+                  </a:lnTo>
+                  <a:lnTo>
+                    <a:pt x="2235613" y="386292"/>
+                  </a:lnTo>
+                  <a:lnTo>
+                    <a:pt x="2235613" y="453893"/>
+                  </a:lnTo>
+                  <a:lnTo>
+                    <a:pt x="2301367" y="453893"/>
+                  </a:lnTo>
+                  <a:lnTo>
+                    <a:pt x="2301367" y="579438"/>
+                  </a:lnTo>
+                  <a:lnTo>
+                    <a:pt x="2367120" y="579438"/>
+                  </a:lnTo>
+                  <a:lnTo>
+                    <a:pt x="2367120" y="656697"/>
+                  </a:lnTo>
+                  <a:lnTo>
+                    <a:pt x="2432873" y="656697"/>
+                  </a:lnTo>
+                  <a:lnTo>
+                    <a:pt x="2432873" y="695326"/>
+                  </a:lnTo>
+                  <a:lnTo>
+                    <a:pt x="2498627" y="695326"/>
+                  </a:lnTo>
+                  <a:lnTo>
+                    <a:pt x="2498627" y="762927"/>
+                  </a:lnTo>
+                  <a:lnTo>
+                    <a:pt x="2564380" y="762927"/>
+                  </a:lnTo>
+                  <a:lnTo>
+                    <a:pt x="2564380" y="811214"/>
+                  </a:lnTo>
+                  <a:lnTo>
+                    <a:pt x="2630133" y="811214"/>
+                  </a:lnTo>
+                  <a:lnTo>
+                    <a:pt x="2630133" y="830529"/>
+                  </a:lnTo>
+                  <a:lnTo>
+                    <a:pt x="2761640" y="830529"/>
+                  </a:lnTo>
+                  <a:lnTo>
+                    <a:pt x="2761640" y="840186"/>
+                  </a:lnTo>
+                  <a:lnTo>
+                    <a:pt x="2958900" y="840186"/>
+                  </a:lnTo>
+                  <a:lnTo>
+                    <a:pt x="2958900" y="859501"/>
+                  </a:lnTo>
+                  <a:lnTo>
+                    <a:pt x="3024654" y="859501"/>
+                  </a:lnTo>
+                  <a:lnTo>
+                    <a:pt x="3024654" y="869158"/>
+                  </a:lnTo>
+                  <a:lnTo>
+                    <a:pt x="3090407" y="869158"/>
+                  </a:lnTo>
+                  <a:lnTo>
+                    <a:pt x="3090407" y="888473"/>
+                  </a:lnTo>
+                  <a:lnTo>
+                    <a:pt x="3156160" y="888473"/>
+                  </a:lnTo>
+                  <a:lnTo>
+                    <a:pt x="3156160" y="907787"/>
+                  </a:lnTo>
+                  <a:lnTo>
+                    <a:pt x="3353420" y="907787"/>
+                  </a:lnTo>
+                  <a:lnTo>
+                    <a:pt x="3353420" y="917445"/>
+                  </a:lnTo>
+                  <a:lnTo>
+                    <a:pt x="3550680" y="917445"/>
+                  </a:lnTo>
+                  <a:lnTo>
+                    <a:pt x="3550680" y="927102"/>
                   </a:lnTo>
                 </a:path>
               </a:pathLst>
@@ -3134,7 +3134,7 @@
           </p:nvSpPr>
           <p:spPr>
             <a:xfrm>
-              <a:off x="5592087" y="2140072"/>
+              <a:off x="5193103" y="2140072"/>
               <a:ext cx="101968" cy="82614"/>
             </a:xfrm>
             <a:prstGeom prst="rect">
@@ -3180,7 +3180,7 @@
           </p:nvSpPr>
           <p:spPr>
             <a:xfrm>
-              <a:off x="5592087" y="2149730"/>
+              <a:off x="5193103" y="2149730"/>
               <a:ext cx="101968" cy="82614"/>
             </a:xfrm>
             <a:prstGeom prst="rect">
@@ -3226,7 +3226,7 @@
           </p:nvSpPr>
           <p:spPr>
             <a:xfrm>
-              <a:off x="5592087" y="1956583"/>
+              <a:off x="5193103" y="1956583"/>
               <a:ext cx="101968" cy="82614"/>
             </a:xfrm>
             <a:prstGeom prst="rect">
@@ -3272,7 +3272,7 @@
           </p:nvSpPr>
           <p:spPr>
             <a:xfrm>
-              <a:off x="5592087" y="2033842"/>
+              <a:off x="5193103" y="2033842"/>
               <a:ext cx="101968" cy="82614"/>
             </a:xfrm>
             <a:prstGeom prst="rect">
@@ -3319,7 +3319,7 @@
           <p:spPr>
             <a:xfrm>
               <a:off x="1693406" y="1040925"/>
-              <a:ext cx="4022806" cy="2984110"/>
+              <a:ext cx="3616434" cy="2984110"/>
             </a:xfrm>
             <a:prstGeom prst="rect">
               <a:avLst/>
@@ -4326,17 +4326,17 @@
           <p:spPr>
             <a:xfrm>
               <a:off x="1693406" y="4025036"/>
-              <a:ext cx="4022806" cy="0"/>
+              <a:ext cx="3616434" cy="0"/>
             </a:xfrm>
             <a:custGeom>
               <a:avLst/>
               <a:pathLst>
-                <a:path w="4022806" h="0">
+                <a:path w="3616434" h="0">
                   <a:moveTo>
                     <a:pt x="0" y="0"/>
                   </a:moveTo>
                   <a:lnTo>
-                    <a:pt x="4022806" y="0"/>
+                    <a:pt x="3616434" y="0"/>
                   </a:lnTo>
                 </a:path>
               </a:pathLst>
@@ -4405,7 +4405,7 @@
           </p:nvSpPr>
           <p:spPr>
             <a:xfrm>
-              <a:off x="2132258" y="4025036"/>
+              <a:off x="2087926" y="4025036"/>
               <a:ext cx="0" cy="44283"/>
             </a:xfrm>
             <a:custGeom>
@@ -4445,7 +4445,7 @@
           </p:nvSpPr>
           <p:spPr>
             <a:xfrm>
-              <a:off x="2571109" y="4025036"/>
+              <a:off x="2482446" y="4025036"/>
               <a:ext cx="0" cy="44283"/>
             </a:xfrm>
             <a:custGeom>
@@ -4485,7 +4485,7 @@
           </p:nvSpPr>
           <p:spPr>
             <a:xfrm>
-              <a:off x="3009961" y="4025036"/>
+              <a:off x="2876967" y="4025036"/>
               <a:ext cx="0" cy="44283"/>
             </a:xfrm>
             <a:custGeom>
@@ -4525,7 +4525,7 @@
           </p:nvSpPr>
           <p:spPr>
             <a:xfrm>
-              <a:off x="3448813" y="4025036"/>
+              <a:off x="3271487" y="4025036"/>
               <a:ext cx="0" cy="44283"/>
             </a:xfrm>
             <a:custGeom>
@@ -4565,7 +4565,7 @@
           </p:nvSpPr>
           <p:spPr>
             <a:xfrm>
-              <a:off x="3887664" y="4025036"/>
+              <a:off x="3666007" y="4025036"/>
               <a:ext cx="0" cy="44283"/>
             </a:xfrm>
             <a:custGeom>
@@ -4605,7 +4605,7 @@
           </p:nvSpPr>
           <p:spPr>
             <a:xfrm>
-              <a:off x="4326516" y="4025036"/>
+              <a:off x="4060527" y="4025036"/>
               <a:ext cx="0" cy="44283"/>
             </a:xfrm>
             <a:custGeom>
@@ -4645,7 +4645,7 @@
           </p:nvSpPr>
           <p:spPr>
             <a:xfrm>
-              <a:off x="4765367" y="4025036"/>
+              <a:off x="4455047" y="4025036"/>
               <a:ext cx="0" cy="44283"/>
             </a:xfrm>
             <a:custGeom>
@@ -4685,7 +4685,7 @@
           </p:nvSpPr>
           <p:spPr>
             <a:xfrm>
-              <a:off x="5204219" y="4025036"/>
+              <a:off x="4849567" y="4025036"/>
               <a:ext cx="0" cy="44283"/>
             </a:xfrm>
             <a:custGeom>
@@ -4725,7 +4725,7 @@
           </p:nvSpPr>
           <p:spPr>
             <a:xfrm>
-              <a:off x="5643071" y="4025036"/>
+              <a:off x="5244087" y="4025036"/>
               <a:ext cx="0" cy="44283"/>
             </a:xfrm>
             <a:custGeom>
@@ -4811,7 +4811,7 @@
           </p:nvSpPr>
           <p:spPr>
             <a:xfrm>
-              <a:off x="2092704" y="4102594"/>
+              <a:off x="2048373" y="4102594"/>
               <a:ext cx="79107" cy="103971"/>
             </a:xfrm>
             <a:prstGeom prst="rect">
@@ -4857,7 +4857,7 @@
           </p:nvSpPr>
           <p:spPr>
             <a:xfrm>
-              <a:off x="2492002" y="4104330"/>
+              <a:off x="2403339" y="4104330"/>
               <a:ext cx="158214" cy="102235"/>
             </a:xfrm>
             <a:prstGeom prst="rect">
@@ -4903,7 +4903,7 @@
           </p:nvSpPr>
           <p:spPr>
             <a:xfrm>
-              <a:off x="2930854" y="4102594"/>
+              <a:off x="2797859" y="4102594"/>
               <a:ext cx="158214" cy="103971"/>
             </a:xfrm>
             <a:prstGeom prst="rect">
@@ -4949,7 +4949,7 @@
           </p:nvSpPr>
           <p:spPr>
             <a:xfrm>
-              <a:off x="3369706" y="4104330"/>
+              <a:off x="3192380" y="4104330"/>
               <a:ext cx="158214" cy="102235"/>
             </a:xfrm>
             <a:prstGeom prst="rect">
@@ -4995,7 +4995,7 @@
           </p:nvSpPr>
           <p:spPr>
             <a:xfrm>
-              <a:off x="3808557" y="4102524"/>
+              <a:off x="3586900" y="4102524"/>
               <a:ext cx="158214" cy="104040"/>
             </a:xfrm>
             <a:prstGeom prst="rect">
@@ -5041,7 +5041,7 @@
           </p:nvSpPr>
           <p:spPr>
             <a:xfrm>
-              <a:off x="4247409" y="4102524"/>
+              <a:off x="3981420" y="4102524"/>
               <a:ext cx="158214" cy="104040"/>
             </a:xfrm>
             <a:prstGeom prst="rect">
@@ -5087,7 +5087,7 @@
           </p:nvSpPr>
           <p:spPr>
             <a:xfrm>
-              <a:off x="4686260" y="4104330"/>
+              <a:off x="4375940" y="4104330"/>
               <a:ext cx="158214" cy="102235"/>
             </a:xfrm>
             <a:prstGeom prst="rect">
@@ -5133,7 +5133,7 @@
           </p:nvSpPr>
           <p:spPr>
             <a:xfrm>
-              <a:off x="5125112" y="4102594"/>
+              <a:off x="4770460" y="4102594"/>
               <a:ext cx="158214" cy="103971"/>
             </a:xfrm>
             <a:prstGeom prst="rect">
@@ -5179,7 +5179,7 @@
           </p:nvSpPr>
           <p:spPr>
             <a:xfrm>
-              <a:off x="5563964" y="4103010"/>
+              <a:off x="5164980" y="4103010"/>
               <a:ext cx="158214" cy="103554"/>
             </a:xfrm>
             <a:prstGeom prst="rect">
@@ -5225,7 +5225,7 @@
           </p:nvSpPr>
           <p:spPr>
             <a:xfrm>
-              <a:off x="3536907" y="4340652"/>
+              <a:off x="3333720" y="4340652"/>
               <a:ext cx="335805" cy="127272"/>
             </a:xfrm>
             <a:prstGeom prst="rect">
@@ -5317,8 +5317,8 @@
           </p:nvSpPr>
           <p:spPr>
             <a:xfrm>
-              <a:off x="5893348" y="2094115"/>
-              <a:ext cx="380925" cy="877731"/>
+              <a:off x="5486976" y="2256115"/>
+              <a:ext cx="787297" cy="553731"/>
             </a:xfrm>
             <a:prstGeom prst="rect">
               <a:avLst/>
@@ -5343,7 +5343,7 @@
           </p:nvSpPr>
           <p:spPr>
             <a:xfrm>
-              <a:off x="5893348" y="2109109"/>
+              <a:off x="5486976" y="2271109"/>
               <a:ext cx="380925" cy="110132"/>
             </a:xfrm>
             <a:prstGeom prst="rect">
@@ -5389,7 +5389,7 @@
           </p:nvSpPr>
           <p:spPr>
             <a:xfrm>
-              <a:off x="5909548" y="2404846"/>
+              <a:off x="5503176" y="2566846"/>
               <a:ext cx="129600" cy="0"/>
             </a:xfrm>
             <a:custGeom>
@@ -5429,7 +5429,7 @@
           </p:nvSpPr>
           <p:spPr>
             <a:xfrm>
-              <a:off x="5923364" y="2383745"/>
+              <a:off x="5516992" y="2545745"/>
               <a:ext cx="101968" cy="82614"/>
             </a:xfrm>
             <a:prstGeom prst="rect">
@@ -5475,7 +5475,7 @@
           </p:nvSpPr>
           <p:spPr>
             <a:xfrm>
-              <a:off x="5909548" y="2566846"/>
+              <a:off x="5503176" y="2728846"/>
               <a:ext cx="129600" cy="0"/>
             </a:xfrm>
             <a:custGeom>
@@ -5515,7 +5515,7 @@
           </p:nvSpPr>
           <p:spPr>
             <a:xfrm>
-              <a:off x="5923364" y="2545745"/>
+              <a:off x="5516992" y="2707745"/>
               <a:ext cx="101968" cy="82614"/>
             </a:xfrm>
             <a:prstGeom prst="rect">
@@ -5561,18 +5561,18 @@
           </p:nvSpPr>
           <p:spPr>
             <a:xfrm>
-              <a:off x="5909548" y="2728846"/>
-              <a:ext cx="129600" cy="0"/>
+              <a:off x="5937185" y="2566846"/>
+              <a:ext cx="129599" cy="0"/>
             </a:xfrm>
             <a:custGeom>
               <a:avLst/>
               <a:pathLst>
-                <a:path w="129600" h="0">
+                <a:path w="129599" h="0">
                   <a:moveTo>
                     <a:pt x="0" y="0"/>
                   </a:moveTo>
                   <a:lnTo>
-                    <a:pt x="129600" y="0"/>
+                    <a:pt x="129599" y="0"/>
                   </a:lnTo>
                 </a:path>
               </a:pathLst>
@@ -5601,7 +5601,7 @@
           </p:nvSpPr>
           <p:spPr>
             <a:xfrm>
-              <a:off x="5923364" y="2707745"/>
+              <a:off x="5951001" y="2545745"/>
               <a:ext cx="101968" cy="82614"/>
             </a:xfrm>
             <a:prstGeom prst="rect">
@@ -5647,18 +5647,18 @@
           </p:nvSpPr>
           <p:spPr>
             <a:xfrm>
-              <a:off x="5909548" y="2890846"/>
-              <a:ext cx="129600" cy="0"/>
+              <a:off x="5937185" y="2728846"/>
+              <a:ext cx="129599" cy="0"/>
             </a:xfrm>
             <a:custGeom>
               <a:avLst/>
               <a:pathLst>
-                <a:path w="129600" h="0">
+                <a:path w="129599" h="0">
                   <a:moveTo>
                     <a:pt x="0" y="0"/>
                   </a:moveTo>
                   <a:lnTo>
-                    <a:pt x="129600" y="0"/>
+                    <a:pt x="129599" y="0"/>
                   </a:lnTo>
                 </a:path>
               </a:pathLst>
@@ -5687,7 +5687,7 @@
           </p:nvSpPr>
           <p:spPr>
             <a:xfrm>
-              <a:off x="5923364" y="2869745"/>
+              <a:off x="5951001" y="2707745"/>
               <a:ext cx="101968" cy="82614"/>
             </a:xfrm>
             <a:prstGeom prst="rect">
@@ -5733,7 +5733,7 @@
           </p:nvSpPr>
           <p:spPr>
             <a:xfrm>
-              <a:off x="6143916" y="2353937"/>
+              <a:off x="5737544" y="2515937"/>
               <a:ext cx="94872" cy="101818"/>
             </a:xfrm>
             <a:prstGeom prst="rect">
@@ -5779,7 +5779,7 @@
           </p:nvSpPr>
           <p:spPr>
             <a:xfrm>
-              <a:off x="6143916" y="2515937"/>
+              <a:off x="5737544" y="2677937"/>
               <a:ext cx="94872" cy="101818"/>
             </a:xfrm>
             <a:prstGeom prst="rect">
@@ -5825,7 +5825,7 @@
           </p:nvSpPr>
           <p:spPr>
             <a:xfrm>
-              <a:off x="6143916" y="2674464"/>
+              <a:off x="6171553" y="2512464"/>
               <a:ext cx="102721" cy="105290"/>
             </a:xfrm>
             <a:prstGeom prst="rect">
@@ -5871,7 +5871,7 @@
           </p:nvSpPr>
           <p:spPr>
             <a:xfrm>
-              <a:off x="6143916" y="2839937"/>
+              <a:off x="6171553" y="2677937"/>
               <a:ext cx="102721" cy="101818"/>
             </a:xfrm>
             <a:prstGeom prst="rect">

</xml_diff>